<commit_message>
Ebay recommender system: added reverse engineering section
</commit_message>
<xml_diff>
--- a/Classes/DATA 607/Data Science in context presentation/Online Reviews.pptx
+++ b/Classes/DATA 607/Data Science in context presentation/Online Reviews.pptx
@@ -303,7 +303,7 @@
           <a:p>
             <a:fld id="{BBC9B02D-FFD9-4902-9FD1-9D7161EC5382}" type="datetimeFigureOut">
               <a:rPr lang="en-GB" smtClean="0"/>
-              <a:t>03/04/2019</a:t>
+              <a:t>10/04/2019</a:t>
             </a:fld>
             <a:endParaRPr lang="en-GB"/>
           </a:p>
@@ -473,7 +473,7 @@
           <a:p>
             <a:fld id="{BBC9B02D-FFD9-4902-9FD1-9D7161EC5382}" type="datetimeFigureOut">
               <a:rPr lang="en-GB" smtClean="0"/>
-              <a:t>03/04/2019</a:t>
+              <a:t>10/04/2019</a:t>
             </a:fld>
             <a:endParaRPr lang="en-GB"/>
           </a:p>
@@ -653,7 +653,7 @@
           <a:p>
             <a:fld id="{BBC9B02D-FFD9-4902-9FD1-9D7161EC5382}" type="datetimeFigureOut">
               <a:rPr lang="en-GB" smtClean="0"/>
-              <a:t>03/04/2019</a:t>
+              <a:t>10/04/2019</a:t>
             </a:fld>
             <a:endParaRPr lang="en-GB"/>
           </a:p>
@@ -823,7 +823,7 @@
           <a:p>
             <a:fld id="{BBC9B02D-FFD9-4902-9FD1-9D7161EC5382}" type="datetimeFigureOut">
               <a:rPr lang="en-GB" smtClean="0"/>
-              <a:t>03/04/2019</a:t>
+              <a:t>10/04/2019</a:t>
             </a:fld>
             <a:endParaRPr lang="en-GB"/>
           </a:p>
@@ -1069,7 +1069,7 @@
           <a:p>
             <a:fld id="{BBC9B02D-FFD9-4902-9FD1-9D7161EC5382}" type="datetimeFigureOut">
               <a:rPr lang="en-GB" smtClean="0"/>
-              <a:t>03/04/2019</a:t>
+              <a:t>10/04/2019</a:t>
             </a:fld>
             <a:endParaRPr lang="en-GB"/>
           </a:p>
@@ -1357,7 +1357,7 @@
           <a:p>
             <a:fld id="{BBC9B02D-FFD9-4902-9FD1-9D7161EC5382}" type="datetimeFigureOut">
               <a:rPr lang="en-GB" smtClean="0"/>
-              <a:t>03/04/2019</a:t>
+              <a:t>10/04/2019</a:t>
             </a:fld>
             <a:endParaRPr lang="en-GB"/>
           </a:p>
@@ -1779,7 +1779,7 @@
           <a:p>
             <a:fld id="{BBC9B02D-FFD9-4902-9FD1-9D7161EC5382}" type="datetimeFigureOut">
               <a:rPr lang="en-GB" smtClean="0"/>
-              <a:t>03/04/2019</a:t>
+              <a:t>10/04/2019</a:t>
             </a:fld>
             <a:endParaRPr lang="en-GB"/>
           </a:p>
@@ -1897,7 +1897,7 @@
           <a:p>
             <a:fld id="{BBC9B02D-FFD9-4902-9FD1-9D7161EC5382}" type="datetimeFigureOut">
               <a:rPr lang="en-GB" smtClean="0"/>
-              <a:t>03/04/2019</a:t>
+              <a:t>10/04/2019</a:t>
             </a:fld>
             <a:endParaRPr lang="en-GB"/>
           </a:p>
@@ -1992,7 +1992,7 @@
           <a:p>
             <a:fld id="{BBC9B02D-FFD9-4902-9FD1-9D7161EC5382}" type="datetimeFigureOut">
               <a:rPr lang="en-GB" smtClean="0"/>
-              <a:t>03/04/2019</a:t>
+              <a:t>10/04/2019</a:t>
             </a:fld>
             <a:endParaRPr lang="en-GB"/>
           </a:p>
@@ -2269,7 +2269,7 @@
           <a:p>
             <a:fld id="{BBC9B02D-FFD9-4902-9FD1-9D7161EC5382}" type="datetimeFigureOut">
               <a:rPr lang="en-GB" smtClean="0"/>
-              <a:t>03/04/2019</a:t>
+              <a:t>10/04/2019</a:t>
             </a:fld>
             <a:endParaRPr lang="en-GB"/>
           </a:p>
@@ -2522,7 +2522,7 @@
           <a:p>
             <a:fld id="{BBC9B02D-FFD9-4902-9FD1-9D7161EC5382}" type="datetimeFigureOut">
               <a:rPr lang="en-GB" smtClean="0"/>
-              <a:t>03/04/2019</a:t>
+              <a:t>10/04/2019</a:t>
             </a:fld>
             <a:endParaRPr lang="en-GB"/>
           </a:p>
@@ -2735,7 +2735,7 @@
           <a:p>
             <a:fld id="{BBC9B02D-FFD9-4902-9FD1-9D7161EC5382}" type="datetimeFigureOut">
               <a:rPr lang="en-GB" smtClean="0"/>
-              <a:t>03/04/2019</a:t>
+              <a:t>10/04/2019</a:t>
             </a:fld>
             <a:endParaRPr lang="en-GB"/>
           </a:p>
@@ -3216,6 +3216,13 @@
   <p:clrMapOvr>
     <a:masterClrMapping/>
   </p:clrMapOvr>
+  <p:timing>
+    <p:tnLst>
+      <p:par>
+        <p:cTn id="1" dur="indefinite" restart="never" nodeType="tmRoot"/>
+      </p:par>
+    </p:tnLst>
+  </p:timing>
 </p:sld>
 </file>
 
@@ -3618,6 +3625,13 @@
   <p:clrMapOvr>
     <a:masterClrMapping/>
   </p:clrMapOvr>
+  <p:timing>
+    <p:tnLst>
+      <p:par>
+        <p:cTn id="1" dur="indefinite" restart="never" nodeType="tmRoot"/>
+      </p:par>
+    </p:tnLst>
+  </p:timing>
 </p:sld>
 </file>
 
@@ -4039,6 +4053,13 @@
   <p:clrMapOvr>
     <a:masterClrMapping/>
   </p:clrMapOvr>
+  <p:timing>
+    <p:tnLst>
+      <p:par>
+        <p:cTn id="1" dur="indefinite" restart="never" nodeType="tmRoot"/>
+      </p:par>
+    </p:tnLst>
+  </p:timing>
 </p:sld>
 </file>
 
@@ -4188,6 +4209,13 @@
   <p:clrMapOvr>
     <a:masterClrMapping/>
   </p:clrMapOvr>
+  <p:timing>
+    <p:tnLst>
+      <p:par>
+        <p:cTn id="1" dur="indefinite" restart="never" nodeType="tmRoot"/>
+      </p:par>
+    </p:tnLst>
+  </p:timing>
 </p:sld>
 </file>
 
@@ -4337,6 +4365,13 @@
   <p:clrMapOvr>
     <a:masterClrMapping/>
   </p:clrMapOvr>
+  <p:timing>
+    <p:tnLst>
+      <p:par>
+        <p:cTn id="1" dur="indefinite" restart="never" nodeType="tmRoot"/>
+      </p:par>
+    </p:tnLst>
+  </p:timing>
 </p:sld>
 </file>
 
@@ -4486,6 +4521,13 @@
   <p:clrMapOvr>
     <a:masterClrMapping/>
   </p:clrMapOvr>
+  <p:timing>
+    <p:tnLst>
+      <p:par>
+        <p:cTn id="1" dur="indefinite" restart="never" nodeType="tmRoot"/>
+      </p:par>
+    </p:tnLst>
+  </p:timing>
 </p:sld>
 </file>
 
@@ -4544,7 +4586,19 @@
             <a:pPr fontAlgn="base"/>
             <a:r>
               <a:rPr lang="en-US" sz="2400" dirty="0" smtClean="0"/>
-              <a:t>Customers care about others’ feelings about a product/service to make crucial decisions</a:t>
+              <a:t>Customers </a:t>
+            </a:r>
+            <a:r>
+              <a:rPr lang="en-US" sz="2400" dirty="0" smtClean="0"/>
+              <a:t>usually rely on</a:t>
+            </a:r>
+            <a:r>
+              <a:rPr lang="en-US" sz="2400" dirty="0" smtClean="0"/>
+              <a:t> </a:t>
+            </a:r>
+            <a:r>
+              <a:rPr lang="en-US" sz="2400" dirty="0" smtClean="0"/>
+              <a:t>others’ feelings about a product/service to make crucial decisions</a:t>
             </a:r>
           </a:p>
           <a:p>
@@ -4634,6 +4688,13 @@
   <p:clrMapOvr>
     <a:masterClrMapping/>
   </p:clrMapOvr>
+  <p:timing>
+    <p:tnLst>
+      <p:par>
+        <p:cTn id="1" dur="indefinite" restart="never" nodeType="tmRoot"/>
+      </p:par>
+    </p:tnLst>
+  </p:timing>
 </p:sld>
 </file>
 
@@ -4760,6 +4821,13 @@
   <p:clrMapOvr>
     <a:masterClrMapping/>
   </p:clrMapOvr>
+  <p:timing>
+    <p:tnLst>
+      <p:par>
+        <p:cTn id="1" dur="indefinite" restart="never" nodeType="tmRoot"/>
+      </p:par>
+    </p:tnLst>
+  </p:timing>
 </p:sld>
 </file>
 
@@ -4942,6 +5010,13 @@
   <p:clrMapOvr>
     <a:masterClrMapping/>
   </p:clrMapOvr>
+  <p:timing>
+    <p:tnLst>
+      <p:par>
+        <p:cTn id="1" dur="indefinite" restart="never" nodeType="tmRoot"/>
+      </p:par>
+    </p:tnLst>
+  </p:timing>
 </p:sld>
 </file>
 
@@ -5051,6 +5126,13 @@
   <p:clrMapOvr>
     <a:masterClrMapping/>
   </p:clrMapOvr>
+  <p:timing>
+    <p:tnLst>
+      <p:par>
+        <p:cTn id="1" dur="indefinite" restart="never" nodeType="tmRoot"/>
+      </p:par>
+    </p:tnLst>
+  </p:timing>
 </p:sld>
 </file>
 
@@ -5230,6 +5312,13 @@
   <p:clrMapOvr>
     <a:masterClrMapping/>
   </p:clrMapOvr>
+  <p:timing>
+    <p:tnLst>
+      <p:par>
+        <p:cTn id="1" dur="indefinite" restart="never" nodeType="tmRoot"/>
+      </p:par>
+    </p:tnLst>
+  </p:timing>
 </p:sld>
 </file>
 
@@ -5298,11 +5387,7 @@
             <a:pPr fontAlgn="base"/>
             <a:r>
               <a:rPr lang="en-GB" dirty="0" smtClean="0"/>
-              <a:t>How do consumers find and leverage online reviews?</a:t>
-            </a:r>
-            <a:r>
-              <a:rPr lang="en-GB" dirty="0" smtClean="0"/>
-              <a:t> </a:t>
+              <a:t>How do consumers find and leverage online reviews? </a:t>
             </a:r>
           </a:p>
           <a:p>
@@ -5313,7 +5398,6 @@
               <a:rPr lang="en-GB" dirty="0" smtClean="0"/>
               <a:t>	Yelp, Google</a:t>
             </a:r>
-            <a:endParaRPr lang="en-GB" dirty="0" smtClean="0"/>
           </a:p>
           <a:p>
             <a:pPr fontAlgn="base"/>
@@ -5347,6 +5431,13 @@
   <p:clrMapOvr>
     <a:masterClrMapping/>
   </p:clrMapOvr>
+  <p:timing>
+    <p:tnLst>
+      <p:par>
+        <p:cTn id="1" dur="indefinite" restart="never" nodeType="tmRoot"/>
+      </p:par>
+    </p:tnLst>
+  </p:timing>
 </p:sld>
 </file>
 
@@ -5437,7 +5528,15 @@
             <a:pPr fontAlgn="base"/>
             <a:r>
               <a:rPr lang="en-GB" sz="2000" dirty="0" smtClean="0"/>
-              <a:t>Had a monthly average of 102 million in Q4 2018</a:t>
+              <a:t>Had a monthly average of 102 </a:t>
+            </a:r>
+            <a:r>
+              <a:rPr lang="en-GB" sz="2000" dirty="0" smtClean="0"/>
+              <a:t>million unique visitors </a:t>
+            </a:r>
+            <a:r>
+              <a:rPr lang="en-GB" sz="2000" dirty="0" smtClean="0"/>
+              <a:t>in Q4 2018</a:t>
             </a:r>
           </a:p>
           <a:p>
@@ -5615,6 +5714,13 @@
   <p:clrMapOvr>
     <a:masterClrMapping/>
   </p:clrMapOvr>
+  <p:timing>
+    <p:tnLst>
+      <p:par>
+        <p:cTn id="1" dur="indefinite" restart="never" nodeType="tmRoot"/>
+      </p:par>
+    </p:tnLst>
+  </p:timing>
 </p:sld>
 </file>
 
@@ -5918,6 +6024,13 @@
   <p:clrMapOvr>
     <a:masterClrMapping/>
   </p:clrMapOvr>
+  <p:timing>
+    <p:tnLst>
+      <p:par>
+        <p:cTn id="1" dur="indefinite" restart="never" nodeType="tmRoot"/>
+      </p:par>
+    </p:tnLst>
+  </p:timing>
 </p:sld>
 </file>
 
@@ -6018,6 +6131,13 @@
   <p:clrMapOvr>
     <a:masterClrMapping/>
   </p:clrMapOvr>
+  <p:timing>
+    <p:tnLst>
+      <p:par>
+        <p:cTn id="1" dur="indefinite" restart="never" nodeType="tmRoot"/>
+      </p:par>
+    </p:tnLst>
+  </p:timing>
 </p:sld>
 </file>
 
@@ -6237,6 +6357,13 @@
   <p:clrMapOvr>
     <a:masterClrMapping/>
   </p:clrMapOvr>
+  <p:timing>
+    <p:tnLst>
+      <p:par>
+        <p:cTn id="1" dur="indefinite" restart="never" nodeType="tmRoot"/>
+      </p:par>
+    </p:tnLst>
+  </p:timing>
 </p:sld>
 </file>
 

</xml_diff>